<commit_message>
Spring Integration - Part1
</commit_message>
<xml_diff>
--- a/si-tutorial/SpringIntegration_Part1.pptx
+++ b/si-tutorial/SpringIntegration_Part1.pptx
@@ -295,7 +295,7 @@
             <a:fld id="{1D8BD707-D9CF-40AE-B4C6-C98DA3205C09}" type="datetimeFigureOut">
               <a:rPr lang="en-US" smtClean="0"/>
               <a:pPr/>
-              <a:t>7/29/2015</a:t>
+              <a:t>7/30/2015</a:t>
             </a:fld>
             <a:endParaRPr lang="en-US"/>
           </a:p>
@@ -462,7 +462,7 @@
             <a:fld id="{1D8BD707-D9CF-40AE-B4C6-C98DA3205C09}" type="datetimeFigureOut">
               <a:rPr lang="en-US" smtClean="0"/>
               <a:pPr/>
-              <a:t>7/29/2015</a:t>
+              <a:t>7/30/2015</a:t>
             </a:fld>
             <a:endParaRPr lang="en-US"/>
           </a:p>
@@ -639,7 +639,7 @@
             <a:fld id="{1D8BD707-D9CF-40AE-B4C6-C98DA3205C09}" type="datetimeFigureOut">
               <a:rPr lang="en-US" smtClean="0"/>
               <a:pPr/>
-              <a:t>7/29/2015</a:t>
+              <a:t>7/30/2015</a:t>
             </a:fld>
             <a:endParaRPr lang="en-US"/>
           </a:p>
@@ -806,7 +806,7 @@
             <a:fld id="{1D8BD707-D9CF-40AE-B4C6-C98DA3205C09}" type="datetimeFigureOut">
               <a:rPr lang="en-US" smtClean="0"/>
               <a:pPr/>
-              <a:t>7/29/2015</a:t>
+              <a:t>7/30/2015</a:t>
             </a:fld>
             <a:endParaRPr lang="en-US"/>
           </a:p>
@@ -1050,7 +1050,7 @@
             <a:fld id="{1D8BD707-D9CF-40AE-B4C6-C98DA3205C09}" type="datetimeFigureOut">
               <a:rPr lang="en-US" smtClean="0"/>
               <a:pPr/>
-              <a:t>7/29/2015</a:t>
+              <a:t>7/30/2015</a:t>
             </a:fld>
             <a:endParaRPr lang="en-US"/>
           </a:p>
@@ -1316,7 +1316,7 @@
             <a:fld id="{1D8BD707-D9CF-40AE-B4C6-C98DA3205C09}" type="datetimeFigureOut">
               <a:rPr lang="en-US" smtClean="0"/>
               <a:pPr/>
-              <a:t>7/29/2015</a:t>
+              <a:t>7/30/2015</a:t>
             </a:fld>
             <a:endParaRPr lang="en-US"/>
           </a:p>
@@ -1696,7 +1696,7 @@
             <a:fld id="{1D8BD707-D9CF-40AE-B4C6-C98DA3205C09}" type="datetimeFigureOut">
               <a:rPr lang="en-US" smtClean="0"/>
               <a:pPr/>
-              <a:t>7/29/2015</a:t>
+              <a:t>7/30/2015</a:t>
             </a:fld>
             <a:endParaRPr lang="en-US"/>
           </a:p>
@@ -1848,7 +1848,7 @@
             <a:fld id="{1D8BD707-D9CF-40AE-B4C6-C98DA3205C09}" type="datetimeFigureOut">
               <a:rPr lang="en-US" smtClean="0"/>
               <a:pPr/>
-              <a:t>7/29/2015</a:t>
+              <a:t>7/30/2015</a:t>
             </a:fld>
             <a:endParaRPr lang="en-US"/>
           </a:p>
@@ -1940,7 +1940,7 @@
             <a:fld id="{1D8BD707-D9CF-40AE-B4C6-C98DA3205C09}" type="datetimeFigureOut">
               <a:rPr lang="en-US" smtClean="0"/>
               <a:pPr/>
-              <a:t>7/29/2015</a:t>
+              <a:t>7/30/2015</a:t>
             </a:fld>
             <a:endParaRPr lang="en-US"/>
           </a:p>
@@ -2203,7 +2203,7 @@
             <a:fld id="{1D8BD707-D9CF-40AE-B4C6-C98DA3205C09}" type="datetimeFigureOut">
               <a:rPr lang="en-US" smtClean="0"/>
               <a:pPr/>
-              <a:t>7/29/2015</a:t>
+              <a:t>7/30/2015</a:t>
             </a:fld>
             <a:endParaRPr lang="en-US"/>
           </a:p>
@@ -2493,7 +2493,7 @@
             <a:fld id="{1D8BD707-D9CF-40AE-B4C6-C98DA3205C09}" type="datetimeFigureOut">
               <a:rPr lang="en-US" smtClean="0"/>
               <a:pPr/>
-              <a:t>7/29/2015</a:t>
+              <a:t>7/30/2015</a:t>
             </a:fld>
             <a:endParaRPr lang="en-US"/>
           </a:p>
@@ -3266,7 +3266,7 @@
             <a:fld id="{1D8BD707-D9CF-40AE-B4C6-C98DA3205C09}" type="datetimeFigureOut">
               <a:rPr lang="en-US" smtClean="0"/>
               <a:pPr/>
-              <a:t>7/29/2015</a:t>
+              <a:t>7/30/2015</a:t>
             </a:fld>
             <a:endParaRPr lang="en-US"/>
           </a:p>
@@ -3902,7 +3902,11 @@
           <a:p>
             <a:r>
               <a:rPr lang="en-US" dirty="0" smtClean="0"/>
-              <a:t>Spring Integration</a:t>
+              <a:t>Spring </a:t>
+            </a:r>
+            <a:r>
+              <a:rPr lang="en-US" dirty="0" smtClean="0"/>
+              <a:t>Integration - Part1</a:t>
             </a:r>
             <a:endParaRPr lang="en-US" dirty="0"/>
           </a:p>
@@ -4154,7 +4158,6 @@
               <a:rPr lang="en-US" sz="2000" dirty="0" smtClean="0"/>
               <a:t>A Channel Adapter is an endpoint that connects a Message Channel to some other system or transport. Channel Adapters may be either inbound or outbound.</a:t>
             </a:r>
-            <a:endParaRPr lang="en-US" sz="2000" dirty="0" smtClean="0"/>
           </a:p>
           <a:p>
             <a:pPr lvl="1"/>
@@ -4162,17 +4165,12 @@
               <a:rPr lang="en-US" sz="2000" dirty="0" smtClean="0"/>
               <a:t>It will do some mapping between the Message and whatever object or resource is received-from or sent-to the other system (File, HTTP Request, JMS Message, etc).</a:t>
             </a:r>
-            <a:endParaRPr lang="en-US" sz="2000" dirty="0" smtClean="0"/>
           </a:p>
           <a:p>
             <a:pPr lvl="1"/>
             <a:r>
               <a:rPr lang="en-US" sz="2000" dirty="0" smtClean="0"/>
-              <a:t>Depending on the transport, the Channel Adapter may also populate or extract Message header values </a:t>
-            </a:r>
-            <a:r>
-              <a:rPr lang="en-US" sz="2000" dirty="0" smtClean="0"/>
-              <a:t>channel. Else channel specified return address from reply message.</a:t>
+              <a:t>Depending on the transport, the Channel Adapter may also populate or extract Message header values channel. Else channel specified return address from reply message.</a:t>
             </a:r>
           </a:p>
           <a:p>
@@ -4333,15 +4331,7 @@
           <a:p>
             <a:r>
               <a:rPr lang="en-US" dirty="0" smtClean="0"/>
-              <a:t>Configure SI either </a:t>
-            </a:r>
-            <a:r>
-              <a:rPr lang="en-US" dirty="0" smtClean="0"/>
-              <a:t>XML namespace </a:t>
-            </a:r>
-            <a:r>
-              <a:rPr lang="en-US" dirty="0" smtClean="0"/>
-              <a:t>support or annotation based Java object</a:t>
+              <a:t>Configure SI either XML namespace support or annotation based Java object</a:t>
             </a:r>
           </a:p>
           <a:p>
@@ -4418,11 +4408,7 @@
             </a:r>
             <a:r>
               <a:rPr lang="en-US" dirty="0" smtClean="0"/>
-              <a:t> @</a:t>
-            </a:r>
-            <a:r>
-              <a:rPr lang="en-US" dirty="0" smtClean="0"/>
-              <a:t>Bean</a:t>
+              <a:t> @Bean</a:t>
             </a:r>
           </a:p>
           <a:p>
@@ -4435,7 +4421,6 @@
               <a:rPr lang="en-US" dirty="0" smtClean="0"/>
               <a:t> @Bean</a:t>
             </a:r>
-            <a:endParaRPr lang="en-US" dirty="0" smtClean="0"/>
           </a:p>
         </p:txBody>
       </p:sp>
@@ -4527,17 +4512,8 @@
             </a:r>
             <a:r>
               <a:rPr lang="en-US" sz="2000" dirty="0" smtClean="0"/>
-              <a:t>="http</a:t>
-            </a:r>
-            <a:r>
-              <a:rPr lang="en-US" sz="2000" dirty="0" smtClean="0"/>
-              <a:t>://</a:t>
-            </a:r>
-            <a:r>
-              <a:rPr lang="en-US" sz="2000" dirty="0" smtClean="0"/>
-              <a:t>www.w3.org/2001/XMLSchema-instance"</a:t>
-            </a:r>
-            <a:endParaRPr lang="en-US" sz="2000" dirty="0" smtClean="0"/>
+              <a:t>="http://www.w3.org/2001/XMLSchema-instance"</a:t>
+            </a:r>
           </a:p>
           <a:p>
             <a:pPr>
@@ -4553,15 +4529,7 @@
             </a:r>
             <a:r>
               <a:rPr lang="en-US" sz="2000" dirty="0" smtClean="0"/>
-              <a:t>=http</a:t>
-            </a:r>
-            <a:r>
-              <a:rPr lang="en-US" sz="2000" dirty="0" smtClean="0"/>
-              <a:t>://</a:t>
-            </a:r>
-            <a:r>
-              <a:rPr lang="en-US" sz="2000" dirty="0" smtClean="0"/>
-              <a:t>www.springframework.org/schema/integration</a:t>
+              <a:t>=http://www.springframework.org/schema/integration</a:t>
             </a:r>
           </a:p>
           <a:p>
@@ -4570,15 +4538,33 @@
             </a:pPr>
             <a:r>
               <a:rPr lang="en-US" sz="2000" dirty="0" smtClean="0"/>
-              <a:t> </a:t>
-            </a:r>
+              <a:t>     http://www.springframework.org/schema/integration/spring-integration.xsd &gt;</a:t>
+            </a:r>
+          </a:p>
+          <a:p>
+            <a:pPr lvl="1"/>
             <a:r>
               <a:rPr lang="en-US" sz="2000" dirty="0" smtClean="0"/>
-              <a:t>    http</a:t>
+              <a:t>&lt;</a:t>
+            </a:r>
+            <a:r>
+              <a:rPr lang="en-US" sz="2000" dirty="0" err="1" smtClean="0"/>
+              <a:t>int:channel</a:t>
             </a:r>
             <a:r>
               <a:rPr lang="en-US" sz="2000" dirty="0" smtClean="0"/>
-              <a:t>://www.springframework.org/schema/integration/spring-integration.xsd </a:t>
+              <a:t> &gt;</a:t>
+            </a:r>
+          </a:p>
+          <a:p>
+            <a:pPr lvl="1"/>
+            <a:r>
+              <a:rPr lang="en-US" sz="2000" dirty="0" smtClean="0"/>
+              <a:t>&lt;</a:t>
+            </a:r>
+            <a:r>
+              <a:rPr lang="en-US" sz="2000" dirty="0" err="1" smtClean="0"/>
+              <a:t>int:gateway</a:t>
             </a:r>
             <a:r>
               <a:rPr lang="en-US" sz="2000" dirty="0" smtClean="0"/>
@@ -4593,11 +4579,7 @@
             </a:r>
             <a:r>
               <a:rPr lang="en-US" sz="2000" dirty="0" err="1" smtClean="0"/>
-              <a:t>int:channel</a:t>
-            </a:r>
-            <a:r>
-              <a:rPr lang="en-US" sz="2000" dirty="0" smtClean="0"/>
-              <a:t> </a:t>
+              <a:t>int:splitter</a:t>
             </a:r>
             <a:r>
               <a:rPr lang="en-US" sz="2000" dirty="0" smtClean="0"/>
@@ -4612,7 +4594,7 @@
             </a:r>
             <a:r>
               <a:rPr lang="en-US" sz="2000" dirty="0" err="1" smtClean="0"/>
-              <a:t>int:gateway</a:t>
+              <a:t>int:router</a:t>
             </a:r>
             <a:r>
               <a:rPr lang="en-US" sz="2000" dirty="0" smtClean="0"/>
@@ -4627,58 +4609,27 @@
             </a:r>
             <a:r>
               <a:rPr lang="en-US" sz="2000" dirty="0" err="1" smtClean="0"/>
-              <a:t>int:splitter</a:t>
+              <a:t>int:service</a:t>
+            </a:r>
+            <a:r>
+              <a:rPr lang="en-US" sz="2000" dirty="0" smtClean="0"/>
+              <a:t>-activator&gt;</a:t>
+            </a:r>
+          </a:p>
+          <a:p>
+            <a:pPr lvl="1"/>
+            <a:r>
+              <a:rPr lang="en-US" sz="2000" dirty="0" smtClean="0"/>
+              <a:t>&lt;</a:t>
+            </a:r>
+            <a:r>
+              <a:rPr lang="en-US" sz="2000" dirty="0" err="1" smtClean="0"/>
+              <a:t>int:aggregator</a:t>
             </a:r>
             <a:r>
               <a:rPr lang="en-US" sz="2000" dirty="0" smtClean="0"/>
               <a:t>&gt;</a:t>
             </a:r>
-          </a:p>
-          <a:p>
-            <a:pPr lvl="1"/>
-            <a:r>
-              <a:rPr lang="en-US" sz="2000" dirty="0" smtClean="0"/>
-              <a:t>&lt;</a:t>
-            </a:r>
-            <a:r>
-              <a:rPr lang="en-US" sz="2000" dirty="0" err="1" smtClean="0"/>
-              <a:t>int:router</a:t>
-            </a:r>
-            <a:r>
-              <a:rPr lang="en-US" sz="2000" dirty="0" smtClean="0"/>
-              <a:t>&gt;</a:t>
-            </a:r>
-          </a:p>
-          <a:p>
-            <a:pPr lvl="1"/>
-            <a:r>
-              <a:rPr lang="en-US" sz="2000" dirty="0" smtClean="0"/>
-              <a:t>&lt;</a:t>
-            </a:r>
-            <a:r>
-              <a:rPr lang="en-US" sz="2000" dirty="0" err="1" smtClean="0"/>
-              <a:t>int:service</a:t>
-            </a:r>
-            <a:r>
-              <a:rPr lang="en-US" sz="2000" dirty="0" smtClean="0"/>
-              <a:t>-activator&gt;</a:t>
-            </a:r>
-          </a:p>
-          <a:p>
-            <a:pPr lvl="1"/>
-            <a:r>
-              <a:rPr lang="en-US" sz="2000" dirty="0" smtClean="0"/>
-              <a:t>&lt;</a:t>
-            </a:r>
-            <a:r>
-              <a:rPr lang="en-US" sz="2000" dirty="0" err="1" smtClean="0"/>
-              <a:t>int:aggregator</a:t>
-            </a:r>
-            <a:r>
-              <a:rPr lang="en-US" sz="2000" dirty="0" smtClean="0"/>
-              <a:t>&gt;</a:t>
-            </a:r>
-            <a:endParaRPr lang="en-US" sz="2000" dirty="0" smtClean="0"/>
           </a:p>
           <a:p>
             <a:pPr>
@@ -4784,29 +4735,13 @@
           <a:p>
             <a:r>
               <a:rPr lang="en-US" dirty="0" smtClean="0"/>
-              <a:t>Use </a:t>
-            </a:r>
-            <a:r>
-              <a:rPr lang="en-US" dirty="0" smtClean="0"/>
-              <a:t>plain old java objects (POJOs) whenever </a:t>
-            </a:r>
-            <a:r>
-              <a:rPr lang="en-US" dirty="0" smtClean="0"/>
-              <a:t>possible</a:t>
-            </a:r>
-          </a:p>
-          <a:p>
-            <a:r>
-              <a:rPr lang="en-US" dirty="0" smtClean="0"/>
-              <a:t>Expose only </a:t>
-            </a:r>
-            <a:r>
-              <a:rPr lang="en-US" dirty="0" smtClean="0"/>
-              <a:t>the framework in your code when absolutely </a:t>
-            </a:r>
-            <a:r>
-              <a:rPr lang="en-US" dirty="0" smtClean="0"/>
-              <a:t>necessary</a:t>
+              <a:t>Use plain old java objects (POJOs) whenever possible</a:t>
+            </a:r>
+          </a:p>
+          <a:p>
+            <a:r>
+              <a:rPr lang="en-US" dirty="0" smtClean="0"/>
+              <a:t>Expose only the framework in your code when absolutely necessary</a:t>
             </a:r>
           </a:p>
           <a:p>
@@ -4828,15 +4763,7 @@
             </a:r>
             <a:r>
               <a:rPr lang="en-US" dirty="0" smtClean="0"/>
-              <a:t>. Defer such uses </a:t>
-            </a:r>
-            <a:r>
-              <a:rPr lang="en-US" dirty="0" smtClean="0"/>
-              <a:t>until later in the context lifecycle</a:t>
-            </a:r>
-            <a:r>
-              <a:rPr lang="en-US" dirty="0" smtClean="0"/>
-              <a:t>.</a:t>
+              <a:t>. Defer such uses until later in the context lifecycle.</a:t>
             </a:r>
           </a:p>
           <a:p>
@@ -5006,19 +4933,7 @@
               <a:rPr lang="en-US" sz="2000" dirty="0" smtClean="0">
                 <a:hlinkClick r:id="rId2"/>
               </a:rPr>
-              <a:t>http</a:t>
-            </a:r>
-            <a:r>
-              <a:rPr lang="en-US" sz="2000" dirty="0" smtClean="0">
-                <a:hlinkClick r:id="rId2"/>
-              </a:rPr>
-              <a:t>://</a:t>
-            </a:r>
-            <a:r>
-              <a:rPr lang="en-US" sz="2000" dirty="0" smtClean="0">
-                <a:hlinkClick r:id="rId2"/>
-              </a:rPr>
-              <a:t>docs.spring.io/spring-integration/reference/htmlsingle/</a:t>
+              <a:t>http://docs.spring.io/spring-integration/reference/htmlsingle/</a:t>
             </a:r>
             <a:endParaRPr lang="en-US" sz="2000" dirty="0" smtClean="0"/>
           </a:p>
@@ -5122,63 +5037,31 @@
             </a:r>
             <a:r>
               <a:rPr lang="en-US" dirty="0" smtClean="0"/>
-              <a:t>:  dependency injection</a:t>
-            </a:r>
-            <a:r>
-              <a:rPr lang="en-US" dirty="0" smtClean="0"/>
-              <a:t>).</a:t>
-            </a:r>
-            <a:endParaRPr lang="en-US" dirty="0" smtClean="0"/>
-          </a:p>
-          <a:p>
-            <a:r>
-              <a:rPr lang="en-US" dirty="0" smtClean="0"/>
-              <a:t>Extend to aspect-oriented </a:t>
-            </a:r>
-            <a:r>
-              <a:rPr lang="en-US" dirty="0" smtClean="0"/>
-              <a:t>programming, its a cross cutting concerns modularizing them into reusable </a:t>
-            </a:r>
-            <a:r>
-              <a:rPr lang="en-US" dirty="0" smtClean="0"/>
-              <a:t>aspects (post and pre processing).</a:t>
-            </a:r>
-            <a:endParaRPr lang="en-US" dirty="0" smtClean="0"/>
-          </a:p>
-          <a:p>
-            <a:r>
-              <a:rPr lang="en-US" dirty="0" smtClean="0"/>
-              <a:t>The Spring framework and portfolio provide a comprehensive programming model for building enterprise </a:t>
-            </a:r>
-            <a:r>
-              <a:rPr lang="en-US" dirty="0" smtClean="0"/>
-              <a:t>applications</a:t>
-            </a:r>
-            <a:endParaRPr lang="en-US" dirty="0" smtClean="0"/>
-          </a:p>
-          <a:p>
-            <a:r>
-              <a:rPr lang="en-US" dirty="0" smtClean="0"/>
-              <a:t>The spring framework is based on well established best practices, such as programming to interfaces, favoring composition over inheritance and simplified abstraction</a:t>
-            </a:r>
-            <a:r>
-              <a:rPr lang="en-US" dirty="0" smtClean="0"/>
-              <a:t>.</a:t>
-            </a:r>
-            <a:endParaRPr lang="en-US" dirty="0" smtClean="0"/>
-          </a:p>
-          <a:p>
-            <a:r>
-              <a:rPr lang="en-US" dirty="0" smtClean="0"/>
-              <a:t>It results a system that is easier to test, understand, maintain, and extend and also increases the level of </a:t>
-            </a:r>
-            <a:r>
-              <a:rPr lang="en-US" dirty="0" smtClean="0"/>
-              <a:t>testability </a:t>
-            </a:r>
-            <a:r>
-              <a:rPr lang="en-US" dirty="0" smtClean="0"/>
-              <a:t>and portability.</a:t>
+              <a:t>:  dependency injection).</a:t>
+            </a:r>
+          </a:p>
+          <a:p>
+            <a:r>
+              <a:rPr lang="en-US" dirty="0" smtClean="0"/>
+              <a:t>Extend to aspect-oriented programming, its a cross cutting concerns modularizing them into reusable aspects (post and pre processing).</a:t>
+            </a:r>
+          </a:p>
+          <a:p>
+            <a:r>
+              <a:rPr lang="en-US" dirty="0" smtClean="0"/>
+              <a:t>The Spring framework and portfolio provide a comprehensive programming model for building enterprise applications</a:t>
+            </a:r>
+          </a:p>
+          <a:p>
+            <a:r>
+              <a:rPr lang="en-US" dirty="0" smtClean="0"/>
+              <a:t>The spring framework is based on well established best practices, such as programming to interfaces, favoring composition over inheritance and simplified abstraction.</a:t>
+            </a:r>
+          </a:p>
+          <a:p>
+            <a:r>
+              <a:rPr lang="en-US" dirty="0" smtClean="0"/>
+              <a:t>It results a system that is easier to test, understand, maintain, and extend and also increases the level of testability and portability.</a:t>
             </a:r>
           </a:p>
           <a:p>
@@ -5278,51 +5161,26 @@
           <a:p>
             <a:r>
               <a:rPr lang="en-US" dirty="0" smtClean="0"/>
-              <a:t>Spring Integration is a simple model for building enterprise integration </a:t>
-            </a:r>
-            <a:r>
-              <a:rPr lang="en-US" dirty="0" smtClean="0"/>
-              <a:t>solutions to maintain separation of concern in essential.</a:t>
-            </a:r>
-          </a:p>
-          <a:p>
-            <a:r>
-              <a:rPr lang="en-US" dirty="0" smtClean="0"/>
-              <a:t>It enables lightweight messaging within Spring-based applications and supports integration with external systems via declarative </a:t>
-            </a:r>
-            <a:r>
-              <a:rPr lang="en-US" dirty="0" smtClean="0"/>
-              <a:t>adapters on higher level </a:t>
-            </a:r>
-            <a:r>
-              <a:rPr lang="en-US" dirty="0" smtClean="0"/>
-              <a:t>of abstraction (remoting, messaging, and </a:t>
-            </a:r>
-            <a:r>
-              <a:rPr lang="en-US" dirty="0" smtClean="0"/>
-              <a:t>scheduling).</a:t>
-            </a:r>
-          </a:p>
-          <a:p>
-            <a:r>
-              <a:rPr lang="en-US" dirty="0" smtClean="0"/>
-              <a:t>It supports message-driven architectures, routing and transformation of </a:t>
-            </a:r>
-            <a:r>
-              <a:rPr lang="en-US" dirty="0" smtClean="0"/>
-              <a:t>messages (different transform and different data format)</a:t>
-            </a:r>
-          </a:p>
-          <a:p>
-            <a:r>
-              <a:rPr lang="en-US" dirty="0" smtClean="0"/>
-              <a:t>As an </a:t>
-            </a:r>
-            <a:r>
-              <a:rPr lang="en-US" dirty="0" smtClean="0"/>
-              <a:t>extension, it provide wide variety of configuration options ( annotation, XML with namespace support element and course direct use if spring integration API)</a:t>
-            </a:r>
-            <a:endParaRPr lang="en-US" dirty="0" smtClean="0"/>
+              <a:t>Spring Integration is a simple model for building enterprise integration solutions to maintain separation of concern in essential.</a:t>
+            </a:r>
+          </a:p>
+          <a:p>
+            <a:r>
+              <a:rPr lang="en-US" dirty="0" smtClean="0"/>
+              <a:t>It enables lightweight messaging within Spring-based applications and supports integration with external systems via declarative adapters on higher level of abstraction (remoting, messaging, and scheduling).</a:t>
+            </a:r>
+          </a:p>
+          <a:p>
+            <a:r>
+              <a:rPr lang="en-US" dirty="0" smtClean="0"/>
+              <a:t>It supports message-driven architectures, routing and transformation of messages (different transform and different data format)</a:t>
+            </a:r>
+          </a:p>
+          <a:p>
+            <a:r>
+              <a:rPr lang="en-US" dirty="0" smtClean="0"/>
+              <a:t>As an extension, it provide wide variety of configuration options ( annotation, XML with namespace support element and course direct use if spring integration API)</a:t>
+            </a:r>
           </a:p>
         </p:txBody>
       </p:sp>
@@ -5417,37 +5275,21 @@
             <a:pPr lvl="1"/>
             <a:r>
               <a:rPr lang="en-US" dirty="0" smtClean="0"/>
-              <a:t>Provide </a:t>
-            </a:r>
-            <a:r>
-              <a:rPr lang="en-US" dirty="0" smtClean="0"/>
-              <a:t>a simple model for implementing complex enterprise integration solutions. </a:t>
+              <a:t>Provide a simple model for implementing complex enterprise integration solutions. </a:t>
             </a:r>
           </a:p>
           <a:p>
             <a:pPr lvl="1"/>
             <a:r>
               <a:rPr lang="en-US" dirty="0" smtClean="0"/>
-              <a:t>Facilitate </a:t>
-            </a:r>
-            <a:r>
-              <a:rPr lang="en-US" dirty="0" smtClean="0"/>
-              <a:t>asynchronous, message-driven behavior within a Spring-based application. </a:t>
+              <a:t>Facilitate asynchronous, message-driven behavior within a Spring-based application. </a:t>
             </a:r>
           </a:p>
           <a:p>
             <a:pPr lvl="1"/>
             <a:r>
               <a:rPr lang="en-US" dirty="0" smtClean="0"/>
-              <a:t>Promote </a:t>
-            </a:r>
-            <a:r>
-              <a:rPr lang="en-US" dirty="0" smtClean="0"/>
-              <a:t>intuitive, incremental adoption for existing Spring users</a:t>
-            </a:r>
-            <a:r>
-              <a:rPr lang="en-US" dirty="0" smtClean="0"/>
-              <a:t>.</a:t>
+              <a:t>Promote intuitive, incremental adoption for existing Spring users.</a:t>
             </a:r>
           </a:p>
           <a:p>
@@ -5467,17 +5309,8 @@
             <a:pPr lvl="1"/>
             <a:r>
               <a:rPr lang="en-US" dirty="0" smtClean="0"/>
-              <a:t>The </a:t>
-            </a:r>
-            <a:r>
-              <a:rPr lang="en-US" dirty="0" smtClean="0"/>
-              <a:t>framework should enforce separation of concerns between business logic and integration </a:t>
-            </a:r>
-            <a:r>
-              <a:rPr lang="en-US" dirty="0" smtClean="0"/>
-              <a:t>logic.</a:t>
-            </a:r>
-            <a:endParaRPr lang="en-US" dirty="0" smtClean="0"/>
+              <a:t>The framework should enforce separation of concerns between business logic and integration logic.</a:t>
+            </a:r>
           </a:p>
         </p:txBody>
       </p:sp>
@@ -5587,15 +5420,7 @@
           <a:p>
             <a:r>
               <a:rPr lang="en-US" dirty="0" smtClean="0"/>
-              <a:t>It follows </a:t>
-            </a:r>
-            <a:r>
-              <a:rPr lang="en-US" dirty="0" smtClean="0"/>
-              <a:t>abstract</a:t>
-            </a:r>
-            <a:r>
-              <a:rPr lang="en-US" dirty="0" smtClean="0"/>
-              <a:t> “pipes-and-filter” model. The “filter” component is capable of producing and/or consuming messages and the “pipes” are transport the messages between the filters.</a:t>
+              <a:t>It follows abstract “pipes-and-filter” model. The “filter” component is capable of producing and/or consuming messages and the “pipes” are transport the messages between the filters.</a:t>
             </a:r>
           </a:p>
           <a:p>
@@ -5840,15 +5665,7 @@
             <a:pPr lvl="1"/>
             <a:r>
               <a:rPr lang="en-US" dirty="0" smtClean="0"/>
-              <a:t>Payload can be any type and </a:t>
-            </a:r>
-            <a:r>
-              <a:rPr lang="en-US" dirty="0" smtClean="0"/>
-              <a:t>h</a:t>
-            </a:r>
-            <a:r>
-              <a:rPr lang="en-US" dirty="0" smtClean="0"/>
-              <a:t>eader contain common information like id, timestamp, correlation id and return address. Used to pass value to and from the connected transport.</a:t>
+              <a:t>Payload can be any type and header contain common information like id, timestamp, correlation id and return address. Used to pass value to and from the connected transport.</a:t>
             </a:r>
           </a:p>
           <a:p>
@@ -5889,26 +5706,14 @@
             <a:pPr lvl="1"/>
             <a:r>
               <a:rPr lang="en-US" dirty="0" smtClean="0"/>
-              <a:t>It represents </a:t>
-            </a:r>
-            <a:r>
-              <a:rPr lang="en-US" dirty="0" smtClean="0"/>
-              <a:t>the "pipe" of a pipes-and-filters </a:t>
-            </a:r>
-            <a:r>
-              <a:rPr lang="en-US" dirty="0" smtClean="0"/>
-              <a:t>architecture and follow either point-to-point or publish/subscribe semantics (i.e.) one consumer to receive message or multiple consumer to broadcast. </a:t>
+              <a:t>It represents the "pipe" of a pipes-and-filters architecture and follow either point-to-point or publish/subscribe semantics (i.e.) one consumer to receive message or multiple consumer to broadcast. </a:t>
             </a:r>
           </a:p>
           <a:p>
             <a:pPr lvl="1"/>
             <a:r>
               <a:rPr lang="en-US" dirty="0" smtClean="0"/>
-              <a:t>Producers send Messages to a channel, and consumers receive Messages from a channel</a:t>
-            </a:r>
-            <a:r>
-              <a:rPr lang="en-US" dirty="0" smtClean="0"/>
-              <a:t>.</a:t>
+              <a:t>Producers send Messages to a channel, and consumers receive Messages from a channel.</a:t>
             </a:r>
           </a:p>
           <a:p>
@@ -5924,7 +5729,6 @@
               <a:rPr lang="en-US" dirty="0" smtClean="0"/>
               <a:t>If configure the consumer as poller, it can only capable to receive messages.</a:t>
             </a:r>
-            <a:endParaRPr lang="en-US" dirty="0" smtClean="0"/>
           </a:p>
           <a:p>
             <a:pPr lvl="1"/>
@@ -6067,43 +5871,22 @@
             <a:pPr lvl="1"/>
             <a:r>
               <a:rPr lang="en-US" dirty="0" smtClean="0"/>
-              <a:t>Message endpoint represents </a:t>
-            </a:r>
-            <a:r>
-              <a:rPr lang="en-US" dirty="0" smtClean="0"/>
-              <a:t>the "filter" of a pipes-and-filters architecture</a:t>
-            </a:r>
-            <a:r>
-              <a:rPr lang="en-US" dirty="0" smtClean="0"/>
-              <a:t>.</a:t>
+              <a:t>Message endpoint represents the "filter" of a pipes-and-filters architecture.</a:t>
             </a:r>
           </a:p>
           <a:p>
             <a:pPr lvl="1"/>
             <a:r>
               <a:rPr lang="en-US" dirty="0" smtClean="0"/>
-              <a:t>It’s a thin </a:t>
-            </a:r>
-            <a:r>
-              <a:rPr lang="en-US" dirty="0" smtClean="0"/>
-              <a:t>but dedicated layer that translates inbound requests into service layer </a:t>
-            </a:r>
-            <a:r>
-              <a:rPr lang="en-US" dirty="0" smtClean="0"/>
-              <a:t>invocations.</a:t>
+              <a:t>It’s a thin but dedicated layer that translates inbound requests into service layer invocations.</a:t>
             </a:r>
           </a:p>
           <a:p>
             <a:pPr lvl="1"/>
             <a:r>
               <a:rPr lang="en-US" dirty="0" smtClean="0"/>
-              <a:t>It translates </a:t>
-            </a:r>
-            <a:r>
-              <a:rPr lang="en-US" dirty="0" smtClean="0"/>
-              <a:t>service layer return values into outbound replies</a:t>
-            </a:r>
-            <a:endParaRPr lang="en-US" dirty="0" smtClean="0"/>
+              <a:t>It translates service layer return values into outbound replies</a:t>
+            </a:r>
           </a:p>
           <a:p>
             <a:r>
@@ -6115,11 +5898,7 @@
             <a:pPr lvl="1"/>
             <a:r>
               <a:rPr lang="en-US" dirty="0" smtClean="0"/>
-              <a:t>Message Endpoints are responsible for connecting the various messaging components to channels</a:t>
-            </a:r>
-            <a:r>
-              <a:rPr lang="en-US" dirty="0" smtClean="0"/>
-              <a:t>. </a:t>
+              <a:t>Message Endpoints are responsible for connecting the various messaging components to channels. </a:t>
             </a:r>
           </a:p>
           <a:p>
@@ -6128,7 +5907,6 @@
               <a:rPr lang="en-US" dirty="0" smtClean="0"/>
               <a:t>Its primary role is to connect application code to the messaging framework and to do so in a non-persistent manner. </a:t>
             </a:r>
-            <a:endParaRPr lang="en-US" dirty="0" smtClean="0"/>
           </a:p>
           <a:p>
             <a:pPr lvl="1"/>
@@ -6142,25 +5920,12 @@
               <a:rPr lang="en-US" b="1" dirty="0" smtClean="0"/>
               <a:t>Transformer</a:t>
             </a:r>
-            <a:endParaRPr lang="en-US" b="1" dirty="0" smtClean="0"/>
           </a:p>
           <a:p>
             <a:pPr lvl="1"/>
             <a:r>
               <a:rPr lang="en-US" dirty="0" smtClean="0"/>
-              <a:t>Message </a:t>
-            </a:r>
-            <a:r>
-              <a:rPr lang="en-US" dirty="0" smtClean="0"/>
-              <a:t>transformer is responsible </a:t>
-            </a:r>
-            <a:r>
-              <a:rPr lang="en-US" dirty="0" smtClean="0"/>
-              <a:t>for </a:t>
-            </a:r>
-            <a:r>
-              <a:rPr lang="en-US" dirty="0" smtClean="0"/>
-              <a:t>converting the message content or structure and return the modified message content like XML Document to java.lang.String .</a:t>
+              <a:t>Message transformer is responsible for converting the message content or structure and return the modified message content like XML Document to java.lang.String .</a:t>
             </a:r>
           </a:p>
           <a:p>
@@ -6168,23 +5933,13 @@
               <a:rPr lang="en-US" b="1" dirty="0" smtClean="0"/>
               <a:t>Filter</a:t>
             </a:r>
-            <a:endParaRPr lang="en-US" b="1" dirty="0" smtClean="0"/>
           </a:p>
           <a:p>
             <a:pPr lvl="1"/>
             <a:r>
               <a:rPr lang="en-US" dirty="0" smtClean="0"/>
-              <a:t>Determines </a:t>
-            </a:r>
-            <a:r>
-              <a:rPr lang="en-US" dirty="0" smtClean="0"/>
-              <a:t>whether a Message should be passed to an output channel at </a:t>
-            </a:r>
-            <a:r>
-              <a:rPr lang="en-US" dirty="0" smtClean="0"/>
-              <a:t>all. It contain simple test method to check payload content type, value and header, etc. and send to the output channel if accepted or else message dropped.</a:t>
-            </a:r>
-            <a:endParaRPr lang="en-US" dirty="0" smtClean="0"/>
+              <a:t>Determines whether a Message should be passed to an output channel at all. It contain simple test method to check payload content type, value and header, etc. and send to the output channel if accepted or else message dropped.</a:t>
+            </a:r>
           </a:p>
           <a:p>
             <a:pPr lvl="1"/>
@@ -6197,15 +5952,7 @@
             <a:pPr lvl="1"/>
             <a:r>
               <a:rPr lang="en-US" dirty="0" smtClean="0"/>
-              <a:t>It not generic </a:t>
-            </a:r>
-            <a:r>
-              <a:rPr lang="en-US" dirty="0" smtClean="0"/>
-              <a:t>use of "filter" within the Pipes-and-Filters architectural </a:t>
-            </a:r>
-            <a:r>
-              <a:rPr lang="en-US" dirty="0" smtClean="0"/>
-              <a:t>pattern with endpoint. It something to selectively narrow down the message between  two channels.</a:t>
+              <a:t>It not generic use of "filter" within the Pipes-and-Filters architectural pattern with endpoint. It something to selectively narrow down the message between  two channels.</a:t>
             </a:r>
           </a:p>
           <a:p>
@@ -6277,27 +6024,14 @@
             <a:pPr lvl="1"/>
             <a:r>
               <a:rPr lang="en-US" dirty="0" smtClean="0"/>
-              <a:t>Basically it decide what the channel or channels should receive the message next, based on some criteria </a:t>
-            </a:r>
-            <a:r>
-              <a:rPr lang="en-US" dirty="0" smtClean="0"/>
-              <a:t>with Message's content and/or metadata available in the Message Headers.</a:t>
-            </a:r>
-            <a:endParaRPr lang="en-US" dirty="0" smtClean="0"/>
+              <a:t>Basically it decide what the channel or channels should receive the message next, based on some criteria with Message's content and/or metadata available in the Message Headers.</a:t>
+            </a:r>
           </a:p>
           <a:p>
             <a:pPr lvl="1"/>
             <a:r>
               <a:rPr lang="en-US" dirty="0" smtClean="0"/>
-              <a:t>Dynamic </a:t>
-            </a:r>
-            <a:r>
-              <a:rPr lang="en-US" dirty="0" smtClean="0"/>
-              <a:t>alternative to a statically configured output </a:t>
-            </a:r>
-            <a:r>
-              <a:rPr lang="en-US" dirty="0" smtClean="0"/>
-              <a:t>channel (Service Activator or other endpoint with sending reply)</a:t>
+              <a:t>Dynamic alternative to a statically configured output channel (Service Activator or other endpoint with sending reply)</a:t>
             </a:r>
           </a:p>
           <a:p>
@@ -6337,28 +6071,19 @@
               <a:rPr lang="en-US" b="1" dirty="0" smtClean="0"/>
               <a:t>Splitter</a:t>
             </a:r>
-            <a:endParaRPr lang="en-US" b="1" dirty="0" smtClean="0"/>
           </a:p>
           <a:p>
             <a:pPr lvl="1"/>
             <a:r>
               <a:rPr lang="en-US" dirty="0" smtClean="0"/>
-              <a:t>A Splitter is another type of Message Endpoint whose responsibility is to accept a Message from its input channel, split that Message into multiple Messages, and then send each of those to its output </a:t>
-            </a:r>
-            <a:r>
-              <a:rPr lang="en-US" dirty="0" smtClean="0"/>
-              <a:t>channel</a:t>
+              <a:t>A Splitter is another type of Message Endpoint whose responsibility is to accept a Message from its input channel, split that Message into multiple Messages, and then send each of those to its output channel</a:t>
             </a:r>
           </a:p>
           <a:p>
             <a:pPr lvl="1"/>
             <a:r>
               <a:rPr lang="en-US" dirty="0" smtClean="0"/>
-              <a:t>It is used dividing </a:t>
-            </a:r>
-            <a:r>
-              <a:rPr lang="en-US" dirty="0" smtClean="0"/>
-              <a:t>a "composite" payload object into a group of Messages containing the sub-divided payloads.</a:t>
+              <a:t>It is used dividing a "composite" payload object into a group of Messages containing the sub-divided payloads.</a:t>
             </a:r>
           </a:p>
           <a:p>
@@ -6383,29 +6108,15 @@
             <a:pPr lvl="1"/>
             <a:r>
               <a:rPr lang="en-US" dirty="0" smtClean="0"/>
-              <a:t>Aggregator little complex to maintain object state (messages to be aggregate) to complete the grouping. It has facility to set timeout </a:t>
-            </a:r>
-            <a:r>
-              <a:rPr lang="en-US" dirty="0" smtClean="0"/>
-              <a:t>it needed, whether to send partial results upon timeout, and the discard channel </a:t>
-            </a:r>
-            <a:endParaRPr lang="en-US" dirty="0" smtClean="0"/>
+              <a:t>Aggregator little complex to maintain object state (messages to be aggregate) to complete the grouping. It has facility to set timeout it needed, whether to send partial results upon timeout, and the discard channel </a:t>
+            </a:r>
           </a:p>
           <a:p>
             <a:pPr lvl="1"/>
             <a:r>
               <a:rPr lang="en-US" dirty="0" smtClean="0"/>
-              <a:t>SI provides </a:t>
-            </a:r>
-            <a:r>
-              <a:rPr lang="en-US" dirty="0" smtClean="0"/>
-              <a:t>a CorrelationStrategy, a ReleaseStrategy and configurable settings for: </a:t>
-            </a:r>
-            <a:r>
-              <a:rPr lang="en-US" dirty="0" smtClean="0"/>
-              <a:t>timeout.</a:t>
-            </a:r>
-            <a:endParaRPr lang="en-US" dirty="0" smtClean="0"/>
+              <a:t>SI provides a CorrelationStrategy, a ReleaseStrategy and configurable settings for: timeout.</a:t>
+            </a:r>
           </a:p>
           <a:p>
             <a:pPr lvl="1">

</xml_diff>